<commit_message>
Bài 3: Tô màu hình cơ bản
</commit_message>
<xml_diff>
--- a/Bài 3 - Tô màu hình vẽ/Bài 3.pptx
+++ b/Bài 3 - Tô màu hình vẽ/Bài 3.pptx
@@ -265,7 +265,7 @@
           <a:p>
             <a:fld id="{187CD168-B2F8-42EE-8F80-ECEFECFA70DF}" type="datetimeFigureOut">
               <a:rPr lang="en-US" smtClean="0"/>
-              <a:t>3/1/2023</a:t>
+              <a:t>3/2/2023</a:t>
             </a:fld>
             <a:endParaRPr lang="en-US"/>
           </a:p>
@@ -463,7 +463,7 @@
           <a:p>
             <a:fld id="{187CD168-B2F8-42EE-8F80-ECEFECFA70DF}" type="datetimeFigureOut">
               <a:rPr lang="en-US" smtClean="0"/>
-              <a:t>3/1/2023</a:t>
+              <a:t>3/2/2023</a:t>
             </a:fld>
             <a:endParaRPr lang="en-US"/>
           </a:p>
@@ -671,7 +671,7 @@
           <a:p>
             <a:fld id="{187CD168-B2F8-42EE-8F80-ECEFECFA70DF}" type="datetimeFigureOut">
               <a:rPr lang="en-US" smtClean="0"/>
-              <a:t>3/1/2023</a:t>
+              <a:t>3/2/2023</a:t>
             </a:fld>
             <a:endParaRPr lang="en-US"/>
           </a:p>
@@ -869,7 +869,7 @@
           <a:p>
             <a:fld id="{187CD168-B2F8-42EE-8F80-ECEFECFA70DF}" type="datetimeFigureOut">
               <a:rPr lang="en-US" smtClean="0"/>
-              <a:t>3/1/2023</a:t>
+              <a:t>3/2/2023</a:t>
             </a:fld>
             <a:endParaRPr lang="en-US"/>
           </a:p>
@@ -1144,7 +1144,7 @@
           <a:p>
             <a:fld id="{187CD168-B2F8-42EE-8F80-ECEFECFA70DF}" type="datetimeFigureOut">
               <a:rPr lang="en-US" smtClean="0"/>
-              <a:t>3/1/2023</a:t>
+              <a:t>3/2/2023</a:t>
             </a:fld>
             <a:endParaRPr lang="en-US"/>
           </a:p>
@@ -1409,7 +1409,7 @@
           <a:p>
             <a:fld id="{187CD168-B2F8-42EE-8F80-ECEFECFA70DF}" type="datetimeFigureOut">
               <a:rPr lang="en-US" smtClean="0"/>
-              <a:t>3/1/2023</a:t>
+              <a:t>3/2/2023</a:t>
             </a:fld>
             <a:endParaRPr lang="en-US"/>
           </a:p>
@@ -1821,7 +1821,7 @@
           <a:p>
             <a:fld id="{187CD168-B2F8-42EE-8F80-ECEFECFA70DF}" type="datetimeFigureOut">
               <a:rPr lang="en-US" smtClean="0"/>
-              <a:t>3/1/2023</a:t>
+              <a:t>3/2/2023</a:t>
             </a:fld>
             <a:endParaRPr lang="en-US"/>
           </a:p>
@@ -1962,7 +1962,7 @@
           <a:p>
             <a:fld id="{187CD168-B2F8-42EE-8F80-ECEFECFA70DF}" type="datetimeFigureOut">
               <a:rPr lang="en-US" smtClean="0"/>
-              <a:t>3/1/2023</a:t>
+              <a:t>3/2/2023</a:t>
             </a:fld>
             <a:endParaRPr lang="en-US"/>
           </a:p>
@@ -2075,7 +2075,7 @@
           <a:p>
             <a:fld id="{187CD168-B2F8-42EE-8F80-ECEFECFA70DF}" type="datetimeFigureOut">
               <a:rPr lang="en-US" smtClean="0"/>
-              <a:t>3/1/2023</a:t>
+              <a:t>3/2/2023</a:t>
             </a:fld>
             <a:endParaRPr lang="en-US"/>
           </a:p>
@@ -2386,7 +2386,7 @@
           <a:p>
             <a:fld id="{187CD168-B2F8-42EE-8F80-ECEFECFA70DF}" type="datetimeFigureOut">
               <a:rPr lang="en-US" smtClean="0"/>
-              <a:t>3/1/2023</a:t>
+              <a:t>3/2/2023</a:t>
             </a:fld>
             <a:endParaRPr lang="en-US"/>
           </a:p>
@@ -2674,7 +2674,7 @@
           <a:p>
             <a:fld id="{187CD168-B2F8-42EE-8F80-ECEFECFA70DF}" type="datetimeFigureOut">
               <a:rPr lang="en-US" smtClean="0"/>
-              <a:t>3/1/2023</a:t>
+              <a:t>3/2/2023</a:t>
             </a:fld>
             <a:endParaRPr lang="en-US"/>
           </a:p>
@@ -2915,7 +2915,7 @@
           <a:p>
             <a:fld id="{187CD168-B2F8-42EE-8F80-ECEFECFA70DF}" type="datetimeFigureOut">
               <a:rPr lang="en-US" smtClean="0"/>
-              <a:t>3/1/2023</a:t>
+              <a:t>3/2/2023</a:t>
             </a:fld>
             <a:endParaRPr lang="en-US"/>
           </a:p>
@@ -3865,7 +3865,16 @@
           <a:bodyPr/>
           <a:lstStyle/>
           <a:p>
-            <a:endParaRPr lang="en-US"/>
+            <a:r>
+              <a:rPr lang="en-US"/>
+              <a:t>Vẽ liên tiếp nhiều đường tròn xếp cạnh nhau.</a:t>
+            </a:r>
+          </a:p>
+          <a:p>
+            <a:r>
+              <a:rPr lang="en-US"/>
+              <a:t>Mỗi đường tròn có bán kính khác nhau và giảm dần. </a:t>
+            </a:r>
           </a:p>
         </p:txBody>
       </p:sp>
@@ -3922,7 +3931,7 @@
           <a:p>
             <a:r>
               <a:rPr lang="en-US"/>
-              <a:t>6. Vẽ hình vòng tròn (Cách 2)</a:t>
+              <a:t>6. Tô màu hình tròn (Cách 2)</a:t>
             </a:r>
           </a:p>
         </p:txBody>
@@ -3948,7 +3957,16 @@
           <a:bodyPr/>
           <a:lstStyle/>
           <a:p>
-            <a:endParaRPr lang="en-US"/>
+            <a:r>
+              <a:rPr lang="en-US"/>
+              <a:t>Vẽ nhiều đoạn thẳng xếp cạnh nhau.</a:t>
+            </a:r>
+          </a:p>
+          <a:p>
+            <a:r>
+              <a:rPr lang="en-US"/>
+              <a:t>Mỗi đoạn thẳng mới được bẻ góc bằng 1 độ.</a:t>
+            </a:r>
           </a:p>
         </p:txBody>
       </p:sp>

</xml_diff>